<commit_message>
added slide on low level utils
git-svn-id: https://scl.googlecode.com/svn/trunk@31 9e9d830c-d880-8c3c-5d35-b3da52a54e29
</commit_message>
<xml_diff>
--- a/docs/SCL overview.pptx
+++ b/docs/SCL overview.pptx
@@ -307,7 +307,7 @@
           <a:p>
             <a:fld id="{B4C71EC6-210F-42DE-9C53-41977AD35B3D}" type="datetimeFigureOut">
               <a:rPr lang="ru-RU" smtClean="0"/>
-              <a:t>11.06.2012</a:t>
+              <a:t>14.06.2012</a:t>
             </a:fld>
             <a:endParaRPr lang="ru-RU"/>
           </a:p>
@@ -472,7 +472,7 @@
           <a:p>
             <a:fld id="{B4C71EC6-210F-42DE-9C53-41977AD35B3D}" type="datetimeFigureOut">
               <a:rPr lang="ru-RU" smtClean="0"/>
-              <a:t>11.06.2012</a:t>
+              <a:t>14.06.2012</a:t>
             </a:fld>
             <a:endParaRPr lang="ru-RU"/>
           </a:p>
@@ -647,7 +647,7 @@
           <a:p>
             <a:fld id="{B4C71EC6-210F-42DE-9C53-41977AD35B3D}" type="datetimeFigureOut">
               <a:rPr lang="ru-RU" smtClean="0"/>
-              <a:t>11.06.2012</a:t>
+              <a:t>14.06.2012</a:t>
             </a:fld>
             <a:endParaRPr lang="ru-RU"/>
           </a:p>
@@ -812,7 +812,7 @@
           <a:p>
             <a:fld id="{B4C71EC6-210F-42DE-9C53-41977AD35B3D}" type="datetimeFigureOut">
               <a:rPr lang="ru-RU" smtClean="0"/>
-              <a:t>11.06.2012</a:t>
+              <a:t>14.06.2012</a:t>
             </a:fld>
             <a:endParaRPr lang="ru-RU"/>
           </a:p>
@@ -1053,7 +1053,7 @@
           <a:p>
             <a:fld id="{B4C71EC6-210F-42DE-9C53-41977AD35B3D}" type="datetimeFigureOut">
               <a:rPr lang="ru-RU" smtClean="0"/>
-              <a:t>11.06.2012</a:t>
+              <a:t>14.06.2012</a:t>
             </a:fld>
             <a:endParaRPr lang="ru-RU"/>
           </a:p>
@@ -1336,7 +1336,7 @@
           <a:p>
             <a:fld id="{B4C71EC6-210F-42DE-9C53-41977AD35B3D}" type="datetimeFigureOut">
               <a:rPr lang="ru-RU" smtClean="0"/>
-              <a:t>11.06.2012</a:t>
+              <a:t>14.06.2012</a:t>
             </a:fld>
             <a:endParaRPr lang="ru-RU"/>
           </a:p>
@@ -1753,7 +1753,7 @@
           <a:p>
             <a:fld id="{B4C71EC6-210F-42DE-9C53-41977AD35B3D}" type="datetimeFigureOut">
               <a:rPr lang="ru-RU" smtClean="0"/>
-              <a:t>11.06.2012</a:t>
+              <a:t>14.06.2012</a:t>
             </a:fld>
             <a:endParaRPr lang="ru-RU"/>
           </a:p>
@@ -1866,7 +1866,7 @@
           <a:p>
             <a:fld id="{B4C71EC6-210F-42DE-9C53-41977AD35B3D}" type="datetimeFigureOut">
               <a:rPr lang="ru-RU" smtClean="0"/>
-              <a:t>11.06.2012</a:t>
+              <a:t>14.06.2012</a:t>
             </a:fld>
             <a:endParaRPr lang="ru-RU"/>
           </a:p>
@@ -1956,7 +1956,7 @@
           <a:p>
             <a:fld id="{B4C71EC6-210F-42DE-9C53-41977AD35B3D}" type="datetimeFigureOut">
               <a:rPr lang="ru-RU" smtClean="0"/>
-              <a:t>11.06.2012</a:t>
+              <a:t>14.06.2012</a:t>
             </a:fld>
             <a:endParaRPr lang="ru-RU"/>
           </a:p>
@@ -2228,7 +2228,7 @@
           <a:p>
             <a:fld id="{B4C71EC6-210F-42DE-9C53-41977AD35B3D}" type="datetimeFigureOut">
               <a:rPr lang="ru-RU" smtClean="0"/>
-              <a:t>11.06.2012</a:t>
+              <a:t>14.06.2012</a:t>
             </a:fld>
             <a:endParaRPr lang="ru-RU"/>
           </a:p>
@@ -2476,7 +2476,7 @@
           <a:p>
             <a:fld id="{B4C71EC6-210F-42DE-9C53-41977AD35B3D}" type="datetimeFigureOut">
               <a:rPr lang="ru-RU" smtClean="0"/>
-              <a:t>11.06.2012</a:t>
+              <a:t>14.06.2012</a:t>
             </a:fld>
             <a:endParaRPr lang="ru-RU"/>
           </a:p>
@@ -2684,7 +2684,7 @@
           <a:p>
             <a:fld id="{B4C71EC6-210F-42DE-9C53-41977AD35B3D}" type="datetimeFigureOut">
               <a:rPr lang="ru-RU" smtClean="0"/>
-              <a:t>11.06.2012</a:t>
+              <a:t>14.06.2012</a:t>
             </a:fld>
             <a:endParaRPr lang="ru-RU"/>
           </a:p>
@@ -4704,7 +4704,15 @@
           <a:bodyPr/>
           <a:lstStyle/>
           <a:p>
-            <a:endParaRPr lang="ru-RU"/>
+            <a:r>
+              <a:rPr lang="en-US" dirty="0" smtClean="0"/>
+              <a:t>Low Level </a:t>
+            </a:r>
+            <a:r>
+              <a:rPr lang="en-US" dirty="0" err="1" smtClean="0"/>
+              <a:t>Utils</a:t>
+            </a:r>
+            <a:endParaRPr lang="ru-RU" dirty="0"/>
           </a:p>
         </p:txBody>
       </p:sp>
@@ -4720,10 +4728,230 @@
         </p:nvSpPr>
         <p:spPr/>
         <p:txBody>
-          <a:bodyPr/>
-          <a:lstStyle/>
-          <a:p>
-            <a:endParaRPr lang="ru-RU"/>
+          <a:bodyPr>
+            <a:normAutofit fontScale="92500" lnSpcReduction="20000"/>
+          </a:bodyPr>
+          <a:lstStyle/>
+          <a:p>
+            <a:r>
+              <a:rPr lang="en-US" dirty="0" smtClean="0"/>
+              <a:t>Assert macros</a:t>
+            </a:r>
+          </a:p>
+          <a:p>
+            <a:pPr lvl="1"/>
+            <a:r>
+              <a:rPr lang="en-US" dirty="0" smtClean="0">
+                <a:solidFill>
+                  <a:schemeClr val="accent5">
+                    <a:lumMod val="50000"/>
+                  </a:schemeClr>
+                </a:solidFill>
+                <a:latin typeface="Consolas" pitchFamily="49" charset="0"/>
+                <a:cs typeface="Consolas" pitchFamily="49" charset="0"/>
+              </a:rPr>
+              <a:t>ASSERT(</a:t>
+            </a:r>
+            <a:r>
+              <a:rPr lang="en-US" dirty="0" err="1" smtClean="0">
+                <a:solidFill>
+                  <a:schemeClr val="accent5">
+                    <a:lumMod val="50000"/>
+                  </a:schemeClr>
+                </a:solidFill>
+                <a:latin typeface="Consolas" pitchFamily="49" charset="0"/>
+                <a:cs typeface="Consolas" pitchFamily="49" charset="0"/>
+              </a:rPr>
+              <a:t>cond</a:t>
+            </a:r>
+            <a:r>
+              <a:rPr lang="en-US" dirty="0" smtClean="0">
+                <a:solidFill>
+                  <a:schemeClr val="accent5">
+                    <a:lumMod val="50000"/>
+                  </a:schemeClr>
+                </a:solidFill>
+                <a:latin typeface="Consolas" pitchFamily="49" charset="0"/>
+                <a:cs typeface="Consolas" pitchFamily="49" charset="0"/>
+              </a:rPr>
+              <a:t>)</a:t>
+            </a:r>
+            <a:r>
+              <a:rPr lang="en-US" dirty="0" smtClean="0"/>
+              <a:t> just checks the condition while </a:t>
+            </a:r>
+            <a:r>
+              <a:rPr lang="en-US" dirty="0" smtClean="0">
+                <a:solidFill>
+                  <a:schemeClr val="accent5">
+                    <a:lumMod val="50000"/>
+                  </a:schemeClr>
+                </a:solidFill>
+                <a:latin typeface="Consolas" pitchFamily="49" charset="0"/>
+                <a:cs typeface="Consolas" pitchFamily="49" charset="0"/>
+              </a:rPr>
+              <a:t>ASSERT_X(</a:t>
+            </a:r>
+            <a:r>
+              <a:rPr lang="en-US" dirty="0" err="1" smtClean="0">
+                <a:solidFill>
+                  <a:schemeClr val="accent5">
+                    <a:lumMod val="50000"/>
+                  </a:schemeClr>
+                </a:solidFill>
+                <a:latin typeface="Consolas" pitchFamily="49" charset="0"/>
+                <a:cs typeface="Consolas" pitchFamily="49" charset="0"/>
+              </a:rPr>
+              <a:t>cond</a:t>
+            </a:r>
+            <a:r>
+              <a:rPr lang="en-US" dirty="0" smtClean="0">
+                <a:solidFill>
+                  <a:schemeClr val="accent5">
+                    <a:lumMod val="50000"/>
+                  </a:schemeClr>
+                </a:solidFill>
+                <a:latin typeface="Consolas" pitchFamily="49" charset="0"/>
+                <a:cs typeface="Consolas" pitchFamily="49" charset="0"/>
+              </a:rPr>
+              <a:t>, where, what)</a:t>
+            </a:r>
+            <a:r>
+              <a:rPr lang="en-US" dirty="0" smtClean="0">
+                <a:latin typeface="Consolas" pitchFamily="49" charset="0"/>
+                <a:cs typeface="Consolas" pitchFamily="49" charset="0"/>
+              </a:rPr>
+              <a:t> </a:t>
+            </a:r>
+            <a:r>
+              <a:rPr lang="en-US" dirty="0" smtClean="0"/>
+              <a:t>prints out additional info on failure</a:t>
+            </a:r>
+          </a:p>
+          <a:p>
+            <a:pPr lvl="1"/>
+            <a:r>
+              <a:rPr lang="en-US" dirty="0" smtClean="0">
+                <a:solidFill>
+                  <a:schemeClr val="accent5">
+                    <a:lumMod val="50000"/>
+                  </a:schemeClr>
+                </a:solidFill>
+              </a:rPr>
+              <a:t>ASSERT</a:t>
+            </a:r>
+            <a:r>
+              <a:rPr lang="en-US" dirty="0" smtClean="0"/>
+              <a:t>/</a:t>
+            </a:r>
+            <a:r>
+              <a:rPr lang="en-US" dirty="0" smtClean="0">
+                <a:solidFill>
+                  <a:schemeClr val="accent5">
+                    <a:lumMod val="50000"/>
+                  </a:schemeClr>
+                </a:solidFill>
+              </a:rPr>
+              <a:t>ASSERT</a:t>
+            </a:r>
+            <a:r>
+              <a:rPr lang="en-US" b="1" dirty="0" smtClean="0">
+                <a:solidFill>
+                  <a:schemeClr val="accent5">
+                    <a:lumMod val="50000"/>
+                  </a:schemeClr>
+                </a:solidFill>
+              </a:rPr>
+              <a:t>D</a:t>
+            </a:r>
+            <a:r>
+              <a:rPr lang="en-US" dirty="0" smtClean="0"/>
+              <a:t>, </a:t>
+            </a:r>
+            <a:r>
+              <a:rPr lang="en-US" dirty="0" smtClean="0">
+                <a:solidFill>
+                  <a:schemeClr val="accent5">
+                    <a:lumMod val="50000"/>
+                  </a:schemeClr>
+                </a:solidFill>
+              </a:rPr>
+              <a:t>ASSERT_X</a:t>
+            </a:r>
+            <a:r>
+              <a:rPr lang="en-US" dirty="0" smtClean="0"/>
+              <a:t>/</a:t>
+            </a:r>
+            <a:r>
+              <a:rPr lang="en-US" dirty="0" smtClean="0">
+                <a:solidFill>
+                  <a:schemeClr val="accent5">
+                    <a:lumMod val="50000"/>
+                  </a:schemeClr>
+                </a:solidFill>
+              </a:rPr>
+              <a:t>ASSERT_X</a:t>
+            </a:r>
+            <a:r>
+              <a:rPr lang="en-US" b="1" dirty="0" smtClean="0">
+                <a:solidFill>
+                  <a:schemeClr val="accent5">
+                    <a:lumMod val="50000"/>
+                  </a:schemeClr>
+                </a:solidFill>
+              </a:rPr>
+              <a:t>D</a:t>
+            </a:r>
+            <a:r>
+              <a:rPr lang="en-US" b="1" dirty="0" smtClean="0"/>
+              <a:t> </a:t>
+            </a:r>
+            <a:r>
+              <a:rPr lang="en-US" dirty="0" smtClean="0"/>
+              <a:t>for release/debug build</a:t>
+            </a:r>
+          </a:p>
+          <a:p>
+            <a:pPr lvl="1"/>
+            <a:r>
+              <a:rPr lang="en-US" dirty="0" smtClean="0"/>
+              <a:t>Most of the time ASSERT_XD should be used</a:t>
+            </a:r>
+          </a:p>
+          <a:p>
+            <a:r>
+              <a:rPr lang="en-US" dirty="0" smtClean="0"/>
+              <a:t>Usage of STL is allowed</a:t>
+            </a:r>
+          </a:p>
+          <a:p>
+            <a:pPr lvl="1"/>
+            <a:r>
+              <a:rPr lang="en-US" dirty="0" smtClean="0"/>
+              <a:t>Below and including UTILS level</a:t>
+            </a:r>
+          </a:p>
+          <a:p>
+            <a:pPr lvl="1"/>
+            <a:r>
+              <a:rPr lang="en-US" dirty="0" smtClean="0"/>
+              <a:t>For non-critical functionality above UTILS</a:t>
+            </a:r>
+          </a:p>
+          <a:p>
+            <a:r>
+              <a:rPr lang="en-US" dirty="0" smtClean="0"/>
+              <a:t>BOOST usage </a:t>
+            </a:r>
+            <a:r>
+              <a:rPr lang="en-US" dirty="0" err="1" smtClean="0"/>
+              <a:t>possibilty</a:t>
+            </a:r>
+            <a:r>
+              <a:rPr lang="en-US" dirty="0" smtClean="0"/>
+              <a:t> has not been studied yet</a:t>
+            </a:r>
+            <a:endParaRPr lang="ru-RU" dirty="0"/>
           </a:p>
         </p:txBody>
       </p:sp>

</xml_diff>

<commit_message>
Slides on Utils and Lists
git-svn-id: https://scl.googlecode.com/svn/trunk@32 9e9d830c-d880-8c3c-5d35-b3da52a54e29
</commit_message>
<xml_diff>
--- a/docs/SCL overview.pptx
+++ b/docs/SCL overview.pptx
@@ -8,6 +8,8 @@
     <p:sldId id="256" r:id="rId2"/>
     <p:sldId id="257" r:id="rId3"/>
     <p:sldId id="258" r:id="rId4"/>
+    <p:sldId id="259" r:id="rId5"/>
+    <p:sldId id="260" r:id="rId6"/>
   </p:sldIdLst>
   <p:sldSz cx="9144000" cy="6858000" type="screen4x3"/>
   <p:notesSz cx="6858000" cy="9144000"/>
@@ -108,7 +110,7 @@
   </p:defaultTextStyle>
   <p:extLst>
     <p:ext uri="{521415D9-36F7-43E2-AB2F-B90AF26B5E84}">
-      <p14:sectionLst xmlns:p14="http://schemas.microsoft.com/office/powerpoint/2010/main">
+      <p14:sectionLst xmlns:p14="http://schemas.microsoft.com/office/powerpoint/2010/main" xmlns="">
         <p14:section name="Раздел по умолчанию" id="{7477D9A0-8CD5-4A13-87B8-A54B73074EDB}">
           <p14:sldIdLst>
             <p14:sldId id="256"/>
@@ -307,6 +309,7 @@
           <a:p>
             <a:fld id="{B4C71EC6-210F-42DE-9C53-41977AD35B3D}" type="datetimeFigureOut">
               <a:rPr lang="ru-RU" smtClean="0"/>
+              <a:pPr/>
               <a:t>14.06.2012</a:t>
             </a:fld>
             <a:endParaRPr lang="ru-RU"/>
@@ -349,6 +352,7 @@
           <a:p>
             <a:fld id="{B19B0651-EE4F-4900-A07F-96A6BFA9D0F0}" type="slidenum">
               <a:rPr lang="ru-RU" smtClean="0"/>
+              <a:pPr/>
               <a:t>‹#›</a:t>
             </a:fld>
             <a:endParaRPr lang="ru-RU"/>
@@ -472,6 +476,7 @@
           <a:p>
             <a:fld id="{B4C71EC6-210F-42DE-9C53-41977AD35B3D}" type="datetimeFigureOut">
               <a:rPr lang="ru-RU" smtClean="0"/>
+              <a:pPr/>
               <a:t>14.06.2012</a:t>
             </a:fld>
             <a:endParaRPr lang="ru-RU"/>
@@ -514,6 +519,7 @@
           <a:p>
             <a:fld id="{B19B0651-EE4F-4900-A07F-96A6BFA9D0F0}" type="slidenum">
               <a:rPr lang="ru-RU" smtClean="0"/>
+              <a:pPr/>
               <a:t>‹#›</a:t>
             </a:fld>
             <a:endParaRPr lang="ru-RU"/>
@@ -647,6 +653,7 @@
           <a:p>
             <a:fld id="{B4C71EC6-210F-42DE-9C53-41977AD35B3D}" type="datetimeFigureOut">
               <a:rPr lang="ru-RU" smtClean="0"/>
+              <a:pPr/>
               <a:t>14.06.2012</a:t>
             </a:fld>
             <a:endParaRPr lang="ru-RU"/>
@@ -689,6 +696,7 @@
           <a:p>
             <a:fld id="{B19B0651-EE4F-4900-A07F-96A6BFA9D0F0}" type="slidenum">
               <a:rPr lang="ru-RU" smtClean="0"/>
+              <a:pPr/>
               <a:t>‹#›</a:t>
             </a:fld>
             <a:endParaRPr lang="ru-RU"/>
@@ -812,6 +820,7 @@
           <a:p>
             <a:fld id="{B4C71EC6-210F-42DE-9C53-41977AD35B3D}" type="datetimeFigureOut">
               <a:rPr lang="ru-RU" smtClean="0"/>
+              <a:pPr/>
               <a:t>14.06.2012</a:t>
             </a:fld>
             <a:endParaRPr lang="ru-RU"/>
@@ -854,6 +863,7 @@
           <a:p>
             <a:fld id="{B19B0651-EE4F-4900-A07F-96A6BFA9D0F0}" type="slidenum">
               <a:rPr lang="ru-RU" smtClean="0"/>
+              <a:pPr/>
               <a:t>‹#›</a:t>
             </a:fld>
             <a:endParaRPr lang="ru-RU"/>
@@ -1053,6 +1063,7 @@
           <a:p>
             <a:fld id="{B4C71EC6-210F-42DE-9C53-41977AD35B3D}" type="datetimeFigureOut">
               <a:rPr lang="ru-RU" smtClean="0"/>
+              <a:pPr/>
               <a:t>14.06.2012</a:t>
             </a:fld>
             <a:endParaRPr lang="ru-RU"/>
@@ -1095,6 +1106,7 @@
           <a:p>
             <a:fld id="{B19B0651-EE4F-4900-A07F-96A6BFA9D0F0}" type="slidenum">
               <a:rPr lang="ru-RU" smtClean="0"/>
+              <a:pPr/>
               <a:t>‹#›</a:t>
             </a:fld>
             <a:endParaRPr lang="ru-RU"/>
@@ -1336,6 +1348,7 @@
           <a:p>
             <a:fld id="{B4C71EC6-210F-42DE-9C53-41977AD35B3D}" type="datetimeFigureOut">
               <a:rPr lang="ru-RU" smtClean="0"/>
+              <a:pPr/>
               <a:t>14.06.2012</a:t>
             </a:fld>
             <a:endParaRPr lang="ru-RU"/>
@@ -1378,6 +1391,7 @@
           <a:p>
             <a:fld id="{B19B0651-EE4F-4900-A07F-96A6BFA9D0F0}" type="slidenum">
               <a:rPr lang="ru-RU" smtClean="0"/>
+              <a:pPr/>
               <a:t>‹#›</a:t>
             </a:fld>
             <a:endParaRPr lang="ru-RU"/>
@@ -1753,6 +1767,7 @@
           <a:p>
             <a:fld id="{B4C71EC6-210F-42DE-9C53-41977AD35B3D}" type="datetimeFigureOut">
               <a:rPr lang="ru-RU" smtClean="0"/>
+              <a:pPr/>
               <a:t>14.06.2012</a:t>
             </a:fld>
             <a:endParaRPr lang="ru-RU"/>
@@ -1795,6 +1810,7 @@
           <a:p>
             <a:fld id="{B19B0651-EE4F-4900-A07F-96A6BFA9D0F0}" type="slidenum">
               <a:rPr lang="ru-RU" smtClean="0"/>
+              <a:pPr/>
               <a:t>‹#›</a:t>
             </a:fld>
             <a:endParaRPr lang="ru-RU"/>
@@ -1866,6 +1882,7 @@
           <a:p>
             <a:fld id="{B4C71EC6-210F-42DE-9C53-41977AD35B3D}" type="datetimeFigureOut">
               <a:rPr lang="ru-RU" smtClean="0"/>
+              <a:pPr/>
               <a:t>14.06.2012</a:t>
             </a:fld>
             <a:endParaRPr lang="ru-RU"/>
@@ -1908,6 +1925,7 @@
           <a:p>
             <a:fld id="{B19B0651-EE4F-4900-A07F-96A6BFA9D0F0}" type="slidenum">
               <a:rPr lang="ru-RU" smtClean="0"/>
+              <a:pPr/>
               <a:t>‹#›</a:t>
             </a:fld>
             <a:endParaRPr lang="ru-RU"/>
@@ -1956,6 +1974,7 @@
           <a:p>
             <a:fld id="{B4C71EC6-210F-42DE-9C53-41977AD35B3D}" type="datetimeFigureOut">
               <a:rPr lang="ru-RU" smtClean="0"/>
+              <a:pPr/>
               <a:t>14.06.2012</a:t>
             </a:fld>
             <a:endParaRPr lang="ru-RU"/>
@@ -1998,6 +2017,7 @@
           <a:p>
             <a:fld id="{B19B0651-EE4F-4900-A07F-96A6BFA9D0F0}" type="slidenum">
               <a:rPr lang="ru-RU" smtClean="0"/>
+              <a:pPr/>
               <a:t>‹#›</a:t>
             </a:fld>
             <a:endParaRPr lang="ru-RU"/>
@@ -2228,6 +2248,7 @@
           <a:p>
             <a:fld id="{B4C71EC6-210F-42DE-9C53-41977AD35B3D}" type="datetimeFigureOut">
               <a:rPr lang="ru-RU" smtClean="0"/>
+              <a:pPr/>
               <a:t>14.06.2012</a:t>
             </a:fld>
             <a:endParaRPr lang="ru-RU"/>
@@ -2270,6 +2291,7 @@
           <a:p>
             <a:fld id="{B19B0651-EE4F-4900-A07F-96A6BFA9D0F0}" type="slidenum">
               <a:rPr lang="ru-RU" smtClean="0"/>
+              <a:pPr/>
               <a:t>‹#›</a:t>
             </a:fld>
             <a:endParaRPr lang="ru-RU"/>
@@ -2476,6 +2498,7 @@
           <a:p>
             <a:fld id="{B4C71EC6-210F-42DE-9C53-41977AD35B3D}" type="datetimeFigureOut">
               <a:rPr lang="ru-RU" smtClean="0"/>
+              <a:pPr/>
               <a:t>14.06.2012</a:t>
             </a:fld>
             <a:endParaRPr lang="ru-RU"/>
@@ -2518,6 +2541,7 @@
           <a:p>
             <a:fld id="{B19B0651-EE4F-4900-A07F-96A6BFA9D0F0}" type="slidenum">
               <a:rPr lang="ru-RU" smtClean="0"/>
+              <a:pPr/>
               <a:t>‹#›</a:t>
             </a:fld>
             <a:endParaRPr lang="ru-RU"/>
@@ -2684,6 +2708,7 @@
           <a:p>
             <a:fld id="{B4C71EC6-210F-42DE-9C53-41977AD35B3D}" type="datetimeFigureOut">
               <a:rPr lang="ru-RU" smtClean="0"/>
+              <a:pPr/>
               <a:t>14.06.2012</a:t>
             </a:fld>
             <a:endParaRPr lang="ru-RU"/>
@@ -2762,6 +2787,7 @@
           <a:p>
             <a:fld id="{B19B0651-EE4F-4900-A07F-96A6BFA9D0F0}" type="slidenum">
               <a:rPr lang="ru-RU" smtClean="0"/>
+              <a:pPr/>
               <a:t>‹#›</a:t>
             </a:fld>
             <a:endParaRPr lang="ru-RU"/>
@@ -3103,7 +3129,7 @@
     </p:spTree>
     <p:extLst>
       <p:ext uri="{BB962C8B-B14F-4D97-AF65-F5344CB8AC3E}">
-        <p14:creationId xmlns:p14="http://schemas.microsoft.com/office/powerpoint/2010/main" val="630872843"/>
+        <p14:creationId xmlns:p14="http://schemas.microsoft.com/office/powerpoint/2010/main" xmlns="" val="630872843"/>
       </p:ext>
     </p:extLst>
   </p:cSld>
@@ -4655,7 +4681,7 @@
     </p:spTree>
     <p:extLst>
       <p:ext uri="{BB962C8B-B14F-4D97-AF65-F5344CB8AC3E}">
-        <p14:creationId xmlns:p14="http://schemas.microsoft.com/office/powerpoint/2010/main" val="1137753693"/>
+        <p14:creationId xmlns:p14="http://schemas.microsoft.com/office/powerpoint/2010/main" xmlns="" val="1137753693"/>
       </p:ext>
     </p:extLst>
   </p:cSld>
@@ -4958,7 +4984,7 @@
     </p:spTree>
     <p:extLst>
       <p:ext uri="{BB962C8B-B14F-4D97-AF65-F5344CB8AC3E}">
-        <p14:creationId xmlns:p14="http://schemas.microsoft.com/office/powerpoint/2010/main" val="3457732271"/>
+        <p14:creationId xmlns:p14="http://schemas.microsoft.com/office/powerpoint/2010/main" xmlns="" val="3457732271"/>
       </p:ext>
     </p:extLst>
   </p:cSld>
@@ -4972,6 +4998,1044 @@
       </p:par>
     </p:tnLst>
   </p:timing>
+</p:sld>
+</file>
+
+<file path=ppt/slides/slide4.xml><?xml version="1.0" encoding="utf-8"?>
+<p:sld xmlns:a="http://schemas.openxmlformats.org/drawingml/2006/main" xmlns:r="http://schemas.openxmlformats.org/officeDocument/2006/relationships" xmlns:p="http://schemas.openxmlformats.org/presentationml/2006/main">
+  <p:cSld>
+    <p:spTree>
+      <p:nvGrpSpPr>
+        <p:cNvPr id="1" name=""/>
+        <p:cNvGrpSpPr/>
+        <p:nvPr/>
+      </p:nvGrpSpPr>
+      <p:grpSpPr>
+        <a:xfrm>
+          <a:off x="0" y="0"/>
+          <a:ext cx="0" cy="0"/>
+          <a:chOff x="0" y="0"/>
+          <a:chExt cx="0" cy="0"/>
+        </a:xfrm>
+      </p:grpSpPr>
+      <p:sp>
+        <p:nvSpPr>
+          <p:cNvPr id="2" name="Title 1"/>
+          <p:cNvSpPr>
+            <a:spLocks noGrp="1"/>
+          </p:cNvSpPr>
+          <p:nvPr>
+            <p:ph type="title"/>
+          </p:nvPr>
+        </p:nvSpPr>
+        <p:spPr/>
+        <p:txBody>
+          <a:bodyPr/>
+          <a:lstStyle/>
+          <a:p>
+            <a:r>
+              <a:rPr lang="en-US" dirty="0" err="1" smtClean="0"/>
+              <a:t>Utils</a:t>
+            </a:r>
+            <a:endParaRPr lang="ru-RU" dirty="0"/>
+          </a:p>
+        </p:txBody>
+      </p:sp>
+      <p:sp>
+        <p:nvSpPr>
+          <p:cNvPr id="3" name="Content Placeholder 2"/>
+          <p:cNvSpPr>
+            <a:spLocks noGrp="1"/>
+          </p:cNvSpPr>
+          <p:nvPr>
+            <p:ph idx="1"/>
+          </p:nvPr>
+        </p:nvSpPr>
+        <p:spPr/>
+        <p:txBody>
+          <a:bodyPr>
+            <a:normAutofit fontScale="92500" lnSpcReduction="20000"/>
+          </a:bodyPr>
+          <a:lstStyle/>
+          <a:p>
+            <a:r>
+              <a:rPr lang="en-US" dirty="0" smtClean="0"/>
+              <a:t>Intrusive lists</a:t>
+            </a:r>
+          </a:p>
+          <a:p>
+            <a:pPr lvl="1"/>
+            <a:r>
+              <a:rPr lang="en-US" dirty="0" smtClean="0"/>
+              <a:t>Double-linked lists that built peer pointers into the object via inheritance</a:t>
+            </a:r>
+          </a:p>
+          <a:p>
+            <a:pPr lvl="1"/>
+            <a:r>
+              <a:rPr lang="en-US" dirty="0" smtClean="0"/>
+              <a:t>An object can be involved in multiple lists</a:t>
+            </a:r>
+          </a:p>
+          <a:p>
+            <a:r>
+              <a:rPr lang="en-US" dirty="0" smtClean="0"/>
+              <a:t>Command line options parser</a:t>
+            </a:r>
+          </a:p>
+          <a:p>
+            <a:pPr lvl="1"/>
+            <a:r>
+              <a:rPr lang="en-US" dirty="0" smtClean="0"/>
+              <a:t>Supports </a:t>
+            </a:r>
+            <a:r>
+              <a:rPr lang="en-US" dirty="0" err="1" smtClean="0"/>
+              <a:t>boolean</a:t>
+            </a:r>
+            <a:r>
+              <a:rPr lang="en-US" dirty="0" smtClean="0"/>
+              <a:t>, integer, floating-point and string options</a:t>
+            </a:r>
+          </a:p>
+          <a:p>
+            <a:pPr lvl="1"/>
+            <a:r>
+              <a:rPr lang="en-US" dirty="0" smtClean="0"/>
+              <a:t>Supports long and short forms of options</a:t>
+            </a:r>
+          </a:p>
+          <a:p>
+            <a:r>
+              <a:rPr lang="en-US" dirty="0" smtClean="0"/>
+              <a:t>Logging support</a:t>
+            </a:r>
+          </a:p>
+          <a:p>
+            <a:pPr lvl="1"/>
+            <a:r>
+              <a:rPr lang="en-US" dirty="0" smtClean="0"/>
+              <a:t>Logging to file</a:t>
+            </a:r>
+          </a:p>
+          <a:p>
+            <a:pPr lvl="1"/>
+            <a:r>
+              <a:rPr lang="en-US" dirty="0" smtClean="0"/>
+              <a:t>Logs can form tree-like hierarchy</a:t>
+            </a:r>
+          </a:p>
+        </p:txBody>
+      </p:sp>
+    </p:spTree>
+  </p:cSld>
+  <p:clrMapOvr>
+    <a:masterClrMapping/>
+  </p:clrMapOvr>
+</p:sld>
+</file>
+
+<file path=ppt/slides/slide5.xml><?xml version="1.0" encoding="utf-8"?>
+<p:sld xmlns:a="http://schemas.openxmlformats.org/drawingml/2006/main" xmlns:r="http://schemas.openxmlformats.org/officeDocument/2006/relationships" xmlns:p="http://schemas.openxmlformats.org/presentationml/2006/main">
+  <p:cSld>
+    <p:spTree>
+      <p:nvGrpSpPr>
+        <p:cNvPr id="1" name=""/>
+        <p:cNvGrpSpPr/>
+        <p:nvPr/>
+      </p:nvGrpSpPr>
+      <p:grpSpPr>
+        <a:xfrm>
+          <a:off x="0" y="0"/>
+          <a:ext cx="0" cy="0"/>
+          <a:chOff x="0" y="0"/>
+          <a:chExt cx="0" cy="0"/>
+        </a:xfrm>
+      </p:grpSpPr>
+      <p:sp>
+        <p:nvSpPr>
+          <p:cNvPr id="2" name="Title 1"/>
+          <p:cNvSpPr>
+            <a:spLocks noGrp="1"/>
+          </p:cNvSpPr>
+          <p:nvPr>
+            <p:ph type="title"/>
+          </p:nvPr>
+        </p:nvSpPr>
+        <p:spPr/>
+        <p:txBody>
+          <a:bodyPr/>
+          <a:lstStyle/>
+          <a:p>
+            <a:r>
+              <a:rPr lang="en-US" dirty="0" smtClean="0"/>
+              <a:t>Intrusive Lists</a:t>
+            </a:r>
+            <a:endParaRPr lang="ru-RU" dirty="0"/>
+          </a:p>
+        </p:txBody>
+      </p:sp>
+      <p:sp>
+        <p:nvSpPr>
+          <p:cNvPr id="57" name="TextBox 56"/>
+          <p:cNvSpPr txBox="1"/>
+          <p:nvPr/>
+        </p:nvSpPr>
+        <p:spPr>
+          <a:xfrm>
+            <a:off x="251520" y="1268760"/>
+            <a:ext cx="8640960" cy="1477328"/>
+          </a:xfrm>
+          <a:prstGeom prst="rect">
+            <a:avLst/>
+          </a:prstGeom>
+          <a:noFill/>
+        </p:spPr>
+        <p:txBody>
+          <a:bodyPr wrap="square" rtlCol="0">
+            <a:spAutoFit/>
+          </a:bodyPr>
+          <a:lstStyle/>
+          <a:p>
+            <a:r>
+              <a:rPr lang="en-US" dirty="0" smtClean="0"/>
+              <a:t>Doubly-liked lists.  One object can participate in multiple list. The peer pointers are stored within the client object.</a:t>
+            </a:r>
+          </a:p>
+          <a:p>
+            <a:endParaRPr lang="en-US" dirty="0" smtClean="0"/>
+          </a:p>
+          <a:p>
+            <a:r>
+              <a:rPr lang="en-US" dirty="0" smtClean="0"/>
+              <a:t>Intrusive lists are created by </a:t>
+            </a:r>
+            <a:r>
+              <a:rPr lang="en-US" dirty="0" err="1" smtClean="0"/>
+              <a:t>subclassing</a:t>
+            </a:r>
+            <a:r>
+              <a:rPr lang="en-US" dirty="0" smtClean="0"/>
+              <a:t> instance of </a:t>
+            </a:r>
+            <a:r>
+              <a:rPr lang="en-US" dirty="0" err="1" smtClean="0"/>
+              <a:t>SListIface</a:t>
+            </a:r>
+            <a:r>
+              <a:rPr lang="en-US" dirty="0" smtClean="0"/>
+              <a:t> ( or </a:t>
+            </a:r>
+            <a:r>
+              <a:rPr lang="en-US" dirty="0" err="1" smtClean="0"/>
+              <a:t>MListIface</a:t>
+            </a:r>
+            <a:r>
+              <a:rPr lang="en-US" dirty="0" smtClean="0"/>
+              <a:t> for multiple lists) template corresponding to user class.</a:t>
+            </a:r>
+          </a:p>
+        </p:txBody>
+      </p:sp>
+      <p:sp>
+        <p:nvSpPr>
+          <p:cNvPr id="58" name="Rectangle 57"/>
+          <p:cNvSpPr/>
+          <p:nvPr/>
+        </p:nvSpPr>
+        <p:spPr>
+          <a:xfrm>
+            <a:off x="251520" y="4365104"/>
+            <a:ext cx="4608512" cy="1508105"/>
+          </a:xfrm>
+          <a:prstGeom prst="rect">
+            <a:avLst/>
+          </a:prstGeom>
+        </p:spPr>
+        <p:txBody>
+          <a:bodyPr wrap="square">
+            <a:spAutoFit/>
+          </a:bodyPr>
+          <a:lstStyle/>
+          <a:p>
+            <a:r>
+              <a:rPr lang="en-US" dirty="0" smtClean="0"/>
+              <a:t>Typical syntax example:</a:t>
+            </a:r>
+          </a:p>
+          <a:p>
+            <a:endParaRPr lang="en-US" dirty="0" smtClean="0"/>
+          </a:p>
+          <a:p>
+            <a:r>
+              <a:rPr lang="en-US" sz="1400" b="1" dirty="0" smtClean="0">
+                <a:solidFill>
+                  <a:srgbClr val="0070C0"/>
+                </a:solidFill>
+                <a:latin typeface="Consolas" pitchFamily="49" charset="0"/>
+                <a:cs typeface="Consolas" pitchFamily="49" charset="0"/>
+              </a:rPr>
+              <a:t>class</a:t>
+            </a:r>
+            <a:r>
+              <a:rPr lang="en-US" sz="1400" dirty="0" smtClean="0">
+                <a:latin typeface="Consolas" pitchFamily="49" charset="0"/>
+                <a:cs typeface="Consolas" pitchFamily="49" charset="0"/>
+              </a:rPr>
+              <a:t> </a:t>
+            </a:r>
+            <a:r>
+              <a:rPr lang="en-US" sz="1400" dirty="0" err="1" smtClean="0">
+                <a:latin typeface="Consolas" pitchFamily="49" charset="0"/>
+                <a:cs typeface="Consolas" pitchFamily="49" charset="0"/>
+              </a:rPr>
+              <a:t>MyClass</a:t>
+            </a:r>
+            <a:r>
+              <a:rPr lang="en-US" sz="1400" dirty="0" smtClean="0">
+                <a:latin typeface="Consolas" pitchFamily="49" charset="0"/>
+                <a:cs typeface="Consolas" pitchFamily="49" charset="0"/>
+              </a:rPr>
+              <a:t>: </a:t>
+            </a:r>
+            <a:r>
+              <a:rPr lang="en-US" sz="1400" b="1" dirty="0" smtClean="0">
+                <a:solidFill>
+                  <a:srgbClr val="0070C0"/>
+                </a:solidFill>
+                <a:latin typeface="Consolas" pitchFamily="49" charset="0"/>
+                <a:cs typeface="Consolas" pitchFamily="49" charset="0"/>
+              </a:rPr>
+              <a:t>public</a:t>
+            </a:r>
+            <a:r>
+              <a:rPr lang="en-US" sz="1400" dirty="0" smtClean="0">
+                <a:latin typeface="Consolas" pitchFamily="49" charset="0"/>
+                <a:cs typeface="Consolas" pitchFamily="49" charset="0"/>
+              </a:rPr>
+              <a:t> </a:t>
+            </a:r>
+            <a:r>
+              <a:rPr lang="en-US" sz="1400" b="1" dirty="0" err="1" smtClean="0">
+                <a:latin typeface="Consolas" pitchFamily="49" charset="0"/>
+                <a:cs typeface="Consolas" pitchFamily="49" charset="0"/>
+              </a:rPr>
+              <a:t>SListIface</a:t>
+            </a:r>
+            <a:r>
+              <a:rPr lang="en-US" sz="1400" dirty="0" smtClean="0">
+                <a:latin typeface="Consolas" pitchFamily="49" charset="0"/>
+                <a:cs typeface="Consolas" pitchFamily="49" charset="0"/>
+              </a:rPr>
+              <a:t>&lt;</a:t>
+            </a:r>
+            <a:r>
+              <a:rPr lang="en-US" sz="1400" dirty="0" err="1" smtClean="0">
+                <a:latin typeface="Consolas" pitchFamily="49" charset="0"/>
+                <a:cs typeface="Consolas" pitchFamily="49" charset="0"/>
+              </a:rPr>
+              <a:t>MyClass</a:t>
+            </a:r>
+            <a:r>
+              <a:rPr lang="en-US" sz="1400" dirty="0" smtClean="0">
+                <a:latin typeface="Consolas" pitchFamily="49" charset="0"/>
+                <a:cs typeface="Consolas" pitchFamily="49" charset="0"/>
+              </a:rPr>
+              <a:t>&gt;</a:t>
+            </a:r>
+          </a:p>
+          <a:p>
+            <a:r>
+              <a:rPr lang="en-US" sz="1400" dirty="0" smtClean="0">
+                <a:latin typeface="Consolas" pitchFamily="49" charset="0"/>
+                <a:cs typeface="Consolas" pitchFamily="49" charset="0"/>
+              </a:rPr>
+              <a:t>{</a:t>
+            </a:r>
+          </a:p>
+          <a:p>
+            <a:r>
+              <a:rPr lang="en-US" sz="1400" dirty="0" smtClean="0">
+                <a:latin typeface="Consolas" pitchFamily="49" charset="0"/>
+                <a:cs typeface="Consolas" pitchFamily="49" charset="0"/>
+              </a:rPr>
+              <a:t>    …</a:t>
+            </a:r>
+          </a:p>
+          <a:p>
+            <a:r>
+              <a:rPr lang="en-US" sz="1400" dirty="0" smtClean="0">
+                <a:latin typeface="Consolas" pitchFamily="49" charset="0"/>
+                <a:cs typeface="Consolas" pitchFamily="49" charset="0"/>
+              </a:rPr>
+              <a:t>};</a:t>
+            </a:r>
+            <a:endParaRPr lang="ru-RU" sz="1400" dirty="0">
+              <a:latin typeface="Consolas" pitchFamily="49" charset="0"/>
+              <a:cs typeface="Consolas" pitchFamily="49" charset="0"/>
+            </a:endParaRPr>
+          </a:p>
+        </p:txBody>
+      </p:sp>
+      <p:grpSp>
+        <p:nvGrpSpPr>
+          <p:cNvPr id="68" name="Group 67"/>
+          <p:cNvGrpSpPr/>
+          <p:nvPr/>
+        </p:nvGrpSpPr>
+        <p:grpSpPr>
+          <a:xfrm>
+            <a:off x="3707904" y="2708920"/>
+            <a:ext cx="4968552" cy="3168352"/>
+            <a:chOff x="3923928" y="1268760"/>
+            <a:chExt cx="4968552" cy="3168352"/>
+          </a:xfrm>
+        </p:grpSpPr>
+        <p:sp>
+          <p:nvSpPr>
+            <p:cNvPr id="12" name="Rectangle 11"/>
+            <p:cNvSpPr/>
+            <p:nvPr/>
+          </p:nvSpPr>
+          <p:spPr>
+            <a:xfrm>
+              <a:off x="5004048" y="1268760"/>
+              <a:ext cx="1728192" cy="3168352"/>
+            </a:xfrm>
+            <a:prstGeom prst="rect">
+              <a:avLst/>
+            </a:prstGeom>
+            <a:solidFill>
+              <a:schemeClr val="accent5">
+                <a:lumMod val="20000"/>
+                <a:lumOff val="80000"/>
+              </a:schemeClr>
+            </a:solidFill>
+            <a:ln w="12700">
+              <a:prstDash val="dash"/>
+            </a:ln>
+          </p:spPr>
+          <p:style>
+            <a:lnRef idx="2">
+              <a:schemeClr val="accent1">
+                <a:shade val="50000"/>
+              </a:schemeClr>
+            </a:lnRef>
+            <a:fillRef idx="1">
+              <a:schemeClr val="accent1"/>
+            </a:fillRef>
+            <a:effectRef idx="0">
+              <a:schemeClr val="accent1"/>
+            </a:effectRef>
+            <a:fontRef idx="minor">
+              <a:schemeClr val="lt1"/>
+            </a:fontRef>
+          </p:style>
+          <p:txBody>
+            <a:bodyPr rtlCol="0" anchor="t" anchorCtr="0"/>
+            <a:lstStyle/>
+            <a:p>
+              <a:pPr algn="ctr"/>
+              <a:r>
+                <a:rPr lang="en-US" sz="1600" dirty="0" err="1" smtClean="0">
+                  <a:solidFill>
+                    <a:schemeClr val="tx1"/>
+                  </a:solidFill>
+                </a:rPr>
+                <a:t>MyClass</a:t>
+              </a:r>
+              <a:endParaRPr lang="ru-RU" sz="1600" dirty="0">
+                <a:solidFill>
+                  <a:schemeClr val="tx1"/>
+                </a:solidFill>
+              </a:endParaRPr>
+            </a:p>
+          </p:txBody>
+        </p:sp>
+        <p:sp>
+          <p:nvSpPr>
+            <p:cNvPr id="13" name="Rectangle 12"/>
+            <p:cNvSpPr/>
+            <p:nvPr/>
+          </p:nvSpPr>
+          <p:spPr>
+            <a:xfrm>
+              <a:off x="5128862" y="2824336"/>
+              <a:ext cx="1478564" cy="1468760"/>
+            </a:xfrm>
+            <a:prstGeom prst="rect">
+              <a:avLst/>
+            </a:prstGeom>
+          </p:spPr>
+          <p:style>
+            <a:lnRef idx="2">
+              <a:schemeClr val="accent1">
+                <a:shade val="50000"/>
+              </a:schemeClr>
+            </a:lnRef>
+            <a:fillRef idx="1">
+              <a:schemeClr val="accent1"/>
+            </a:fillRef>
+            <a:effectRef idx="0">
+              <a:schemeClr val="accent1"/>
+            </a:effectRef>
+            <a:fontRef idx="minor">
+              <a:schemeClr val="lt1"/>
+            </a:fontRef>
+          </p:style>
+          <p:txBody>
+            <a:bodyPr rtlCol="0" anchor="ctr"/>
+            <a:lstStyle/>
+            <a:p>
+              <a:pPr algn="ctr"/>
+              <a:r>
+                <a:rPr lang="en-US" sz="2800" dirty="0" smtClean="0">
+                  <a:cs typeface="Consolas" pitchFamily="49" charset="0"/>
+                </a:rPr>
+                <a:t>User </a:t>
+              </a:r>
+              <a:r>
+                <a:rPr lang="en-US" sz="2800" dirty="0" smtClean="0">
+                  <a:cs typeface="Consolas" pitchFamily="49" charset="0"/>
+                </a:rPr>
+                <a:t>Data</a:t>
+              </a:r>
+              <a:endParaRPr lang="en-US" dirty="0" smtClean="0">
+                <a:latin typeface="Consolas" pitchFamily="49" charset="0"/>
+                <a:cs typeface="Consolas" pitchFamily="49" charset="0"/>
+              </a:endParaRPr>
+            </a:p>
+          </p:txBody>
+        </p:sp>
+        <p:sp>
+          <p:nvSpPr>
+            <p:cNvPr id="15" name="Rectangle 14"/>
+            <p:cNvSpPr/>
+            <p:nvPr/>
+          </p:nvSpPr>
+          <p:spPr>
+            <a:xfrm>
+              <a:off x="5128862" y="1700808"/>
+              <a:ext cx="1478564" cy="1008112"/>
+            </a:xfrm>
+            <a:prstGeom prst="rect">
+              <a:avLst/>
+            </a:prstGeom>
+            <a:solidFill>
+              <a:schemeClr val="accent4">
+                <a:lumMod val="40000"/>
+                <a:lumOff val="60000"/>
+              </a:schemeClr>
+            </a:solidFill>
+          </p:spPr>
+          <p:style>
+            <a:lnRef idx="2">
+              <a:schemeClr val="accent1">
+                <a:shade val="50000"/>
+              </a:schemeClr>
+            </a:lnRef>
+            <a:fillRef idx="1">
+              <a:schemeClr val="accent1"/>
+            </a:fillRef>
+            <a:effectRef idx="0">
+              <a:schemeClr val="accent1"/>
+            </a:effectRef>
+            <a:fontRef idx="minor">
+              <a:schemeClr val="lt1"/>
+            </a:fontRef>
+          </p:style>
+          <p:txBody>
+            <a:bodyPr rtlCol="0" anchor="t" anchorCtr="0"/>
+            <a:lstStyle/>
+            <a:p>
+              <a:pPr algn="ctr"/>
+              <a:r>
+                <a:rPr lang="en-US" sz="1400" dirty="0" err="1" smtClean="0">
+                  <a:solidFill>
+                    <a:schemeClr val="tx1"/>
+                  </a:solidFill>
+                </a:rPr>
+                <a:t>SListItem</a:t>
+              </a:r>
+              <a:endParaRPr lang="ru-RU" sz="1400" dirty="0">
+                <a:solidFill>
+                  <a:schemeClr val="tx1"/>
+                </a:solidFill>
+              </a:endParaRPr>
+            </a:p>
+          </p:txBody>
+        </p:sp>
+        <p:sp>
+          <p:nvSpPr>
+            <p:cNvPr id="20" name="Rectangle 19"/>
+            <p:cNvSpPr/>
+            <p:nvPr/>
+          </p:nvSpPr>
+          <p:spPr>
+            <a:xfrm>
+              <a:off x="5220072" y="1988840"/>
+              <a:ext cx="1296144" cy="288032"/>
+            </a:xfrm>
+            <a:prstGeom prst="rect">
+              <a:avLst/>
+            </a:prstGeom>
+          </p:spPr>
+          <p:style>
+            <a:lnRef idx="2">
+              <a:schemeClr val="accent1">
+                <a:shade val="50000"/>
+              </a:schemeClr>
+            </a:lnRef>
+            <a:fillRef idx="1">
+              <a:schemeClr val="accent1"/>
+            </a:fillRef>
+            <a:effectRef idx="0">
+              <a:schemeClr val="accent1"/>
+            </a:effectRef>
+            <a:fontRef idx="minor">
+              <a:schemeClr val="lt1"/>
+            </a:fontRef>
+          </p:style>
+          <p:txBody>
+            <a:bodyPr rtlCol="0" anchor="ctr"/>
+            <a:lstStyle/>
+            <a:p>
+              <a:pPr algn="ctr"/>
+              <a:r>
+                <a:rPr lang="en-US" dirty="0" smtClean="0"/>
+                <a:t>next</a:t>
+              </a:r>
+              <a:endParaRPr lang="ru-RU" dirty="0"/>
+            </a:p>
+          </p:txBody>
+        </p:sp>
+        <p:sp>
+          <p:nvSpPr>
+            <p:cNvPr id="29" name="Rectangle 28"/>
+            <p:cNvSpPr/>
+            <p:nvPr/>
+          </p:nvSpPr>
+          <p:spPr>
+            <a:xfrm>
+              <a:off x="5220072" y="2348880"/>
+              <a:ext cx="1296144" cy="288032"/>
+            </a:xfrm>
+            <a:prstGeom prst="rect">
+              <a:avLst/>
+            </a:prstGeom>
+          </p:spPr>
+          <p:style>
+            <a:lnRef idx="2">
+              <a:schemeClr val="accent1">
+                <a:shade val="50000"/>
+              </a:schemeClr>
+            </a:lnRef>
+            <a:fillRef idx="1">
+              <a:schemeClr val="accent1"/>
+            </a:fillRef>
+            <a:effectRef idx="0">
+              <a:schemeClr val="accent1"/>
+            </a:effectRef>
+            <a:fontRef idx="minor">
+              <a:schemeClr val="lt1"/>
+            </a:fontRef>
+          </p:style>
+          <p:txBody>
+            <a:bodyPr rtlCol="0" anchor="ctr"/>
+            <a:lstStyle/>
+            <a:p>
+              <a:pPr algn="ctr"/>
+              <a:r>
+                <a:rPr lang="en-US" dirty="0" err="1" smtClean="0"/>
+                <a:t>prev</a:t>
+              </a:r>
+              <a:endParaRPr lang="ru-RU" dirty="0"/>
+            </a:p>
+          </p:txBody>
+        </p:sp>
+        <p:sp>
+          <p:nvSpPr>
+            <p:cNvPr id="47" name="Rectangle 46"/>
+            <p:cNvSpPr/>
+            <p:nvPr/>
+          </p:nvSpPr>
+          <p:spPr>
+            <a:xfrm>
+              <a:off x="7164288" y="1268760"/>
+              <a:ext cx="1728192" cy="3168352"/>
+            </a:xfrm>
+            <a:prstGeom prst="rect">
+              <a:avLst/>
+            </a:prstGeom>
+            <a:solidFill>
+              <a:schemeClr val="accent5">
+                <a:lumMod val="20000"/>
+                <a:lumOff val="80000"/>
+              </a:schemeClr>
+            </a:solidFill>
+            <a:ln w="12700">
+              <a:prstDash val="dash"/>
+            </a:ln>
+          </p:spPr>
+          <p:style>
+            <a:lnRef idx="2">
+              <a:schemeClr val="accent1">
+                <a:shade val="50000"/>
+              </a:schemeClr>
+            </a:lnRef>
+            <a:fillRef idx="1">
+              <a:schemeClr val="accent1"/>
+            </a:fillRef>
+            <a:effectRef idx="0">
+              <a:schemeClr val="accent1"/>
+            </a:effectRef>
+            <a:fontRef idx="minor">
+              <a:schemeClr val="lt1"/>
+            </a:fontRef>
+          </p:style>
+          <p:txBody>
+            <a:bodyPr rtlCol="0" anchor="t" anchorCtr="0"/>
+            <a:lstStyle/>
+            <a:p>
+              <a:pPr algn="ctr"/>
+              <a:r>
+                <a:rPr lang="en-US" sz="1600" dirty="0" err="1" smtClean="0">
+                  <a:solidFill>
+                    <a:schemeClr val="tx1"/>
+                  </a:solidFill>
+                </a:rPr>
+                <a:t>MyClass</a:t>
+              </a:r>
+              <a:endParaRPr lang="ru-RU" sz="1600" dirty="0">
+                <a:solidFill>
+                  <a:schemeClr val="tx1"/>
+                </a:solidFill>
+              </a:endParaRPr>
+            </a:p>
+          </p:txBody>
+        </p:sp>
+        <p:sp>
+          <p:nvSpPr>
+            <p:cNvPr id="48" name="Rectangle 47"/>
+            <p:cNvSpPr/>
+            <p:nvPr/>
+          </p:nvSpPr>
+          <p:spPr>
+            <a:xfrm>
+              <a:off x="7289102" y="2824336"/>
+              <a:ext cx="1478564" cy="1468760"/>
+            </a:xfrm>
+            <a:prstGeom prst="rect">
+              <a:avLst/>
+            </a:prstGeom>
+          </p:spPr>
+          <p:style>
+            <a:lnRef idx="2">
+              <a:schemeClr val="accent1">
+                <a:shade val="50000"/>
+              </a:schemeClr>
+            </a:lnRef>
+            <a:fillRef idx="1">
+              <a:schemeClr val="accent1"/>
+            </a:fillRef>
+            <a:effectRef idx="0">
+              <a:schemeClr val="accent1"/>
+            </a:effectRef>
+            <a:fontRef idx="minor">
+              <a:schemeClr val="lt1"/>
+            </a:fontRef>
+          </p:style>
+          <p:txBody>
+            <a:bodyPr rtlCol="0" anchor="ctr"/>
+            <a:lstStyle/>
+            <a:p>
+              <a:pPr algn="ctr"/>
+              <a:r>
+                <a:rPr lang="en-US" sz="2800" dirty="0" smtClean="0">
+                  <a:cs typeface="Consolas" pitchFamily="49" charset="0"/>
+                </a:rPr>
+                <a:t>User </a:t>
+              </a:r>
+              <a:r>
+                <a:rPr lang="en-US" sz="2800" dirty="0" smtClean="0">
+                  <a:cs typeface="Consolas" pitchFamily="49" charset="0"/>
+                </a:rPr>
+                <a:t>Data</a:t>
+              </a:r>
+              <a:endParaRPr lang="en-US" dirty="0" smtClean="0">
+                <a:latin typeface="Consolas" pitchFamily="49" charset="0"/>
+                <a:cs typeface="Consolas" pitchFamily="49" charset="0"/>
+              </a:endParaRPr>
+            </a:p>
+          </p:txBody>
+        </p:sp>
+        <p:sp>
+          <p:nvSpPr>
+            <p:cNvPr id="49" name="Rectangle 48"/>
+            <p:cNvSpPr/>
+            <p:nvPr/>
+          </p:nvSpPr>
+          <p:spPr>
+            <a:xfrm>
+              <a:off x="7289102" y="1700808"/>
+              <a:ext cx="1478564" cy="1008112"/>
+            </a:xfrm>
+            <a:prstGeom prst="rect">
+              <a:avLst/>
+            </a:prstGeom>
+            <a:solidFill>
+              <a:schemeClr val="accent4">
+                <a:lumMod val="40000"/>
+                <a:lumOff val="60000"/>
+              </a:schemeClr>
+            </a:solidFill>
+          </p:spPr>
+          <p:style>
+            <a:lnRef idx="2">
+              <a:schemeClr val="accent1">
+                <a:shade val="50000"/>
+              </a:schemeClr>
+            </a:lnRef>
+            <a:fillRef idx="1">
+              <a:schemeClr val="accent1"/>
+            </a:fillRef>
+            <a:effectRef idx="0">
+              <a:schemeClr val="accent1"/>
+            </a:effectRef>
+            <a:fontRef idx="minor">
+              <a:schemeClr val="lt1"/>
+            </a:fontRef>
+          </p:style>
+          <p:txBody>
+            <a:bodyPr rtlCol="0" anchor="t" anchorCtr="0"/>
+            <a:lstStyle/>
+            <a:p>
+              <a:pPr algn="ctr"/>
+              <a:r>
+                <a:rPr lang="en-US" sz="1400" dirty="0" err="1" smtClean="0">
+                  <a:solidFill>
+                    <a:schemeClr val="tx1"/>
+                  </a:solidFill>
+                </a:rPr>
+                <a:t>SListItem</a:t>
+              </a:r>
+              <a:endParaRPr lang="ru-RU" sz="1400" dirty="0">
+                <a:solidFill>
+                  <a:schemeClr val="tx1"/>
+                </a:solidFill>
+              </a:endParaRPr>
+            </a:p>
+          </p:txBody>
+        </p:sp>
+        <p:sp>
+          <p:nvSpPr>
+            <p:cNvPr id="50" name="Rectangle 49"/>
+            <p:cNvSpPr/>
+            <p:nvPr/>
+          </p:nvSpPr>
+          <p:spPr>
+            <a:xfrm>
+              <a:off x="7380312" y="1988840"/>
+              <a:ext cx="1296144" cy="288032"/>
+            </a:xfrm>
+            <a:prstGeom prst="rect">
+              <a:avLst/>
+            </a:prstGeom>
+          </p:spPr>
+          <p:style>
+            <a:lnRef idx="2">
+              <a:schemeClr val="accent1">
+                <a:shade val="50000"/>
+              </a:schemeClr>
+            </a:lnRef>
+            <a:fillRef idx="1">
+              <a:schemeClr val="accent1"/>
+            </a:fillRef>
+            <a:effectRef idx="0">
+              <a:schemeClr val="accent1"/>
+            </a:effectRef>
+            <a:fontRef idx="minor">
+              <a:schemeClr val="lt1"/>
+            </a:fontRef>
+          </p:style>
+          <p:txBody>
+            <a:bodyPr rtlCol="0" anchor="ctr"/>
+            <a:lstStyle/>
+            <a:p>
+              <a:pPr algn="ctr"/>
+              <a:r>
+                <a:rPr lang="en-US" dirty="0" smtClean="0"/>
+                <a:t>next</a:t>
+              </a:r>
+              <a:endParaRPr lang="ru-RU" dirty="0"/>
+            </a:p>
+          </p:txBody>
+        </p:sp>
+        <p:sp>
+          <p:nvSpPr>
+            <p:cNvPr id="51" name="Rectangle 50"/>
+            <p:cNvSpPr/>
+            <p:nvPr/>
+          </p:nvSpPr>
+          <p:spPr>
+            <a:xfrm>
+              <a:off x="7380312" y="2348880"/>
+              <a:ext cx="1296144" cy="288032"/>
+            </a:xfrm>
+            <a:prstGeom prst="rect">
+              <a:avLst/>
+            </a:prstGeom>
+          </p:spPr>
+          <p:style>
+            <a:lnRef idx="2">
+              <a:schemeClr val="accent1">
+                <a:shade val="50000"/>
+              </a:schemeClr>
+            </a:lnRef>
+            <a:fillRef idx="1">
+              <a:schemeClr val="accent1"/>
+            </a:fillRef>
+            <a:effectRef idx="0">
+              <a:schemeClr val="accent1"/>
+            </a:effectRef>
+            <a:fontRef idx="minor">
+              <a:schemeClr val="lt1"/>
+            </a:fontRef>
+          </p:style>
+          <p:txBody>
+            <a:bodyPr rtlCol="0" anchor="ctr"/>
+            <a:lstStyle/>
+            <a:p>
+              <a:pPr algn="ctr"/>
+              <a:r>
+                <a:rPr lang="en-US" dirty="0" err="1" smtClean="0"/>
+                <a:t>prev</a:t>
+              </a:r>
+              <a:endParaRPr lang="ru-RU" dirty="0"/>
+            </a:p>
+          </p:txBody>
+        </p:sp>
+        <p:cxnSp>
+          <p:nvCxnSpPr>
+            <p:cNvPr id="55" name="Elbow Connector 54"/>
+            <p:cNvCxnSpPr>
+              <a:stCxn id="20" idx="3"/>
+            </p:cNvCxnSpPr>
+            <p:nvPr/>
+          </p:nvCxnSpPr>
+          <p:spPr>
+            <a:xfrm flipV="1">
+              <a:off x="6516216" y="1772816"/>
+              <a:ext cx="792088" cy="360040"/>
+            </a:xfrm>
+            <a:prstGeom prst="bentConnector3">
+              <a:avLst>
+                <a:gd name="adj1" fmla="val 50000"/>
+              </a:avLst>
+            </a:prstGeom>
+            <a:ln w="12700">
+              <a:tailEnd type="arrow"/>
+            </a:ln>
+          </p:spPr>
+          <p:style>
+            <a:lnRef idx="1">
+              <a:schemeClr val="accent1"/>
+            </a:lnRef>
+            <a:fillRef idx="0">
+              <a:schemeClr val="accent1"/>
+            </a:fillRef>
+            <a:effectRef idx="0">
+              <a:schemeClr val="accent1"/>
+            </a:effectRef>
+            <a:fontRef idx="minor">
+              <a:schemeClr val="tx1"/>
+            </a:fontRef>
+          </p:style>
+        </p:cxnSp>
+        <p:sp>
+          <p:nvSpPr>
+            <p:cNvPr id="61" name="TextBox 60"/>
+            <p:cNvSpPr txBox="1"/>
+            <p:nvPr/>
+          </p:nvSpPr>
+          <p:spPr>
+            <a:xfrm>
+              <a:off x="3923928" y="1700808"/>
+              <a:ext cx="676788" cy="369332"/>
+            </a:xfrm>
+            <a:prstGeom prst="rect">
+              <a:avLst/>
+            </a:prstGeom>
+            <a:solidFill>
+              <a:schemeClr val="accent1">
+                <a:alpha val="33000"/>
+              </a:schemeClr>
+            </a:solidFill>
+            <a:ln w="9525">
+              <a:solidFill>
+                <a:schemeClr val="tx1"/>
+              </a:solidFill>
+              <a:prstDash val="dash"/>
+            </a:ln>
+          </p:spPr>
+          <p:txBody>
+            <a:bodyPr wrap="none" rtlCol="0">
+              <a:spAutoFit/>
+            </a:bodyPr>
+            <a:lstStyle/>
+            <a:p>
+              <a:r>
+                <a:rPr lang="en-US" dirty="0" smtClean="0"/>
+                <a:t>NULL</a:t>
+              </a:r>
+              <a:endParaRPr lang="ru-RU" dirty="0"/>
+            </a:p>
+          </p:txBody>
+        </p:sp>
+        <p:cxnSp>
+          <p:nvCxnSpPr>
+            <p:cNvPr id="64" name="Elbow Connector 63"/>
+            <p:cNvCxnSpPr>
+              <a:stCxn id="29" idx="1"/>
+              <a:endCxn id="61" idx="3"/>
+            </p:cNvCxnSpPr>
+            <p:nvPr/>
+          </p:nvCxnSpPr>
+          <p:spPr>
+            <a:xfrm rot="10800000">
+              <a:off x="4600716" y="1885474"/>
+              <a:ext cx="619356" cy="607422"/>
+            </a:xfrm>
+            <a:prstGeom prst="bentConnector3">
+              <a:avLst>
+                <a:gd name="adj1" fmla="val 50000"/>
+              </a:avLst>
+            </a:prstGeom>
+            <a:ln>
+              <a:tailEnd type="arrow"/>
+            </a:ln>
+          </p:spPr>
+          <p:style>
+            <a:lnRef idx="1">
+              <a:schemeClr val="accent1"/>
+            </a:lnRef>
+            <a:fillRef idx="0">
+              <a:schemeClr val="accent1"/>
+            </a:fillRef>
+            <a:effectRef idx="0">
+              <a:schemeClr val="accent1"/>
+            </a:effectRef>
+            <a:fontRef idx="minor">
+              <a:schemeClr val="tx1"/>
+            </a:fontRef>
+          </p:style>
+        </p:cxnSp>
+      </p:grpSp>
+    </p:spTree>
+  </p:cSld>
+  <p:clrMapOvr>
+    <a:masterClrMapping/>
+  </p:clrMapOvr>
 </p:sld>
 </file>
 

</xml_diff>